<commit_message>
push changes to data publication notes
</commit_message>
<xml_diff>
--- a/Day_1/Lectures/Day_1_Pub+Link.pptx
+++ b/Day_1/Lectures/Day_1_Pub+Link.pptx
@@ -4045,7 +4045,11 @@
           <a:p>
             <a:r>
               <a:rPr lang="en-US" dirty="0" smtClean="0"/>
-              <a:t>Data Publication and Linking</a:t>
+              <a:t>Data </a:t>
+            </a:r>
+            <a:r>
+              <a:rPr lang="en-US" dirty="0" smtClean="0"/>
+              <a:t>Publication</a:t>
             </a:r>
             <a:endParaRPr lang="en-US" dirty="0"/>
           </a:p>
@@ -4177,18 +4181,13 @@
             </a:pPr>
             <a:r>
               <a:rPr lang="en-US" dirty="0" smtClean="0"/>
-              <a:t>First step in receiving credit for data sharing</a:t>
-            </a:r>
-          </a:p>
-          <a:p>
-            <a:pPr>
-              <a:buFontTx/>
-              <a:buChar char="-"/>
-            </a:pPr>
+              <a:t>First step in receiving credit for data </a:t>
+            </a:r>
             <a:r>
               <a:rPr lang="en-US" dirty="0" smtClean="0"/>
-              <a:t>Allow for meaningful integration of different data sources</a:t>
-            </a:r>
+              <a:t>sharing</a:t>
+            </a:r>
+            <a:endParaRPr lang="en-US" dirty="0" smtClean="0"/>
           </a:p>
         </p:txBody>
       </p:sp>

</xml_diff>